<commit_message>
Changed Story Board and UML
</commit_message>
<xml_diff>
--- a/UML.pptx
+++ b/UML.pptx
@@ -3292,6 +3292,26 @@
                 </a:rPr>
                 <a:t>;</a:t>
               </a:r>
+              <a:endParaRPr lang="en-US" sz="1200" dirty="0">
+                <a:solidFill>
+                  <a:schemeClr val="tx1"/>
+                </a:solidFill>
+              </a:endParaRPr>
+            </a:p>
+            <a:p>
+              <a:r>
+                <a:rPr lang="en-US" sz="1200" dirty="0" smtClean="0">
+                  <a:solidFill>
+                    <a:schemeClr val="tx1"/>
+                  </a:solidFill>
+                </a:rPr>
+                <a:t>List&lt;Card&gt; attacks;</a:t>
+              </a:r>
+              <a:endParaRPr lang="en-US" sz="1200" dirty="0" smtClean="0">
+                <a:solidFill>
+                  <a:schemeClr val="tx1"/>
+                </a:solidFill>
+              </a:endParaRPr>
             </a:p>
             <a:p>
               <a:pPr algn="ctr"/>
@@ -3525,6 +3545,29 @@
                   </a:solidFill>
                 </a:rPr>
                 <a:t>;</a:t>
+              </a:r>
+              <a:br>
+                <a:rPr lang="en-US" sz="1200" dirty="0" smtClean="0">
+                  <a:solidFill>
+                    <a:schemeClr val="tx1"/>
+                  </a:solidFill>
+                </a:rPr>
+              </a:br>
+              <a:r>
+                <a:rPr lang="en-US" sz="1200" dirty="0" smtClean="0">
+                  <a:solidFill>
+                    <a:schemeClr val="tx1"/>
+                  </a:solidFill>
+                </a:rPr>
+                <a:t>List&lt;Card</a:t>
+              </a:r>
+              <a:r>
+                <a:rPr lang="en-US" sz="1200" smtClean="0">
+                  <a:solidFill>
+                    <a:schemeClr val="tx1"/>
+                  </a:solidFill>
+                </a:rPr>
+                <a:t>&gt; attacks;</a:t>
               </a:r>
               <a:endParaRPr lang="en-US" sz="1200" dirty="0">
                 <a:solidFill>
@@ -4712,29 +4755,8 @@
                     <a:schemeClr val="tx1"/>
                   </a:solidFill>
                 </a:rPr>
-                <a:t> </a:t>
-              </a:r>
-              <a:r>
-                <a:rPr lang="en-US" dirty="0" smtClean="0">
-                  <a:solidFill>
-                    <a:schemeClr val="tx1"/>
-                  </a:solidFill>
-                </a:rPr>
-                <a:t>&lt;class</a:t>
-              </a:r>
-              <a:r>
-                <a:rPr lang="en-US" dirty="0" smtClean="0">
-                  <a:solidFill>
-                    <a:schemeClr val="tx1"/>
-                  </a:solidFill>
-                </a:rPr>
-                <a:t>&gt;</a:t>
-              </a:r>
-              <a:endParaRPr lang="en-US" dirty="0" smtClean="0">
-                <a:solidFill>
-                  <a:schemeClr val="tx1"/>
-                </a:solidFill>
-              </a:endParaRPr>
+                <a:t> &lt;class&gt;</a:t>
+              </a:r>
             </a:p>
           </p:txBody>
         </p:sp>

</xml_diff>